<commit_message>
Updated plan and slides
</commit_message>
<xml_diff>
--- a/docs/ProjectPlanPresentation.pptx
+++ b/docs/ProjectPlanPresentation.pptx
@@ -10203,8 +10203,8 @@
         </p:nvSpPr>
         <p:spPr>
           <a:xfrm>
-            <a:off x="1297500" y="1567550"/>
-            <a:ext cx="3521400" cy="2911200"/>
+            <a:off x="1083575" y="1110350"/>
+            <a:ext cx="3264900" cy="2911200"/>
           </a:xfrm>
           <a:prstGeom prst="rect">
             <a:avLst/>
@@ -10227,7 +10227,7 @@
             </a:pPr>
             <a:r>
               <a:rPr lang="en"/>
-              <a:t>Team:</a:t>
+              <a:t>CSE Team:</a:t>
             </a:r>
             <a:endParaRPr/>
           </a:p>
@@ -10244,11 +10244,7 @@
             </a:pPr>
             <a:r>
               <a:rPr lang="en"/>
-              <a:t>CSE: </a:t>
-            </a:r>
-            <a:r>
-              <a:rPr lang="en"/>
-              <a:t>Chris Millsap &amp; Giampiero Corsbie</a:t>
+              <a:t>Chris Millsap</a:t>
             </a:r>
             <a:endParaRPr/>
           </a:p>
@@ -10265,7 +10261,7 @@
             </a:pPr>
             <a:r>
               <a:rPr lang="en"/>
-              <a:t>Various members from BIO, CSE, ECE, MEE</a:t>
+              <a:t>Giampiero Corsbie</a:t>
             </a:r>
             <a:endParaRPr/>
           </a:p>
@@ -10299,6 +10295,56 @@
             <a:r>
               <a:rPr lang="en"/>
               <a:t>Dr. Philip Chan</a:t>
+            </a:r>
+            <a:endParaRPr/>
+          </a:p>
+          <a:p>
+            <a:pPr indent="0" lvl="0" marL="0" rtl="0" algn="l">
+              <a:spcBef>
+                <a:spcPts val="1600"/>
+              </a:spcBef>
+              <a:spcAft>
+                <a:spcPts val="0"/>
+              </a:spcAft>
+              <a:buNone/>
+            </a:pPr>
+            <a:r>
+              <a:rPr lang="en"/>
+              <a:t>Potential Clients/Sponsors:</a:t>
+            </a:r>
+            <a:endParaRPr/>
+          </a:p>
+          <a:p>
+            <a:pPr indent="-311150" lvl="0" marL="457200" rtl="0" algn="l">
+              <a:spcBef>
+                <a:spcPts val="1600"/>
+              </a:spcBef>
+              <a:spcAft>
+                <a:spcPts val="0"/>
+              </a:spcAft>
+              <a:buSzPts val="1300"/>
+              <a:buChar char="●"/>
+            </a:pPr>
+            <a:r>
+              <a:rPr lang="en"/>
+              <a:t>NASA</a:t>
+            </a:r>
+            <a:endParaRPr/>
+          </a:p>
+          <a:p>
+            <a:pPr indent="-311150" lvl="0" marL="457200" rtl="0" algn="l">
+              <a:spcBef>
+                <a:spcPts val="0"/>
+              </a:spcBef>
+              <a:spcAft>
+                <a:spcPts val="0"/>
+              </a:spcAft>
+              <a:buSzPts val="1300"/>
+              <a:buChar char="●"/>
+            </a:pPr>
+            <a:r>
+              <a:rPr lang="en"/>
+              <a:t>Companies that want prolonged human habitation in space and/or on other planets</a:t>
             </a:r>
             <a:endParaRPr/>
           </a:p>
@@ -10329,8 +10375,8 @@
         </p:nvSpPr>
         <p:spPr>
           <a:xfrm>
-            <a:off x="4967100" y="1567550"/>
-            <a:ext cx="3369300" cy="2911200"/>
+            <a:off x="4348400" y="1110350"/>
+            <a:ext cx="4693200" cy="3481200"/>
           </a:xfrm>
           <a:prstGeom prst="rect">
             <a:avLst/>
@@ -10345,60 +10391,6 @@
             <a:pPr indent="0" lvl="0" marL="0" rtl="0" algn="l">
               <a:spcBef>
                 <a:spcPts val="0"/>
-              </a:spcBef>
-              <a:spcAft>
-                <a:spcPts val="0"/>
-              </a:spcAft>
-              <a:buNone/>
-            </a:pPr>
-            <a:r>
-              <a:rPr lang="en"/>
-              <a:t>Potential Clients/Sponsors</a:t>
-            </a:r>
-            <a:r>
-              <a:rPr lang="en"/>
-              <a:t>:</a:t>
-            </a:r>
-            <a:endParaRPr/>
-          </a:p>
-          <a:p>
-            <a:pPr indent="-311150" lvl="0" marL="457200" rtl="0" algn="l">
-              <a:spcBef>
-                <a:spcPts val="1600"/>
-              </a:spcBef>
-              <a:spcAft>
-                <a:spcPts val="0"/>
-              </a:spcAft>
-              <a:buSzPts val="1300"/>
-              <a:buChar char="●"/>
-            </a:pPr>
-            <a:r>
-              <a:rPr lang="en"/>
-              <a:t>NASA</a:t>
-            </a:r>
-            <a:endParaRPr/>
-          </a:p>
-          <a:p>
-            <a:pPr indent="-311150" lvl="0" marL="457200" rtl="0" algn="l">
-              <a:spcBef>
-                <a:spcPts val="0"/>
-              </a:spcBef>
-              <a:spcAft>
-                <a:spcPts val="0"/>
-              </a:spcAft>
-              <a:buSzPts val="1300"/>
-              <a:buChar char="●"/>
-            </a:pPr>
-            <a:r>
-              <a:rPr lang="en"/>
-              <a:t>Companies that want prolonged human habitation in space and/or on other planets</a:t>
-            </a:r>
-            <a:endParaRPr/>
-          </a:p>
-          <a:p>
-            <a:pPr indent="0" lvl="0" marL="0" rtl="0" algn="l">
-              <a:spcBef>
-                <a:spcPts val="1600"/>
               </a:spcBef>
               <a:spcAft>
                 <a:spcPts val="0"/>
@@ -10428,20 +10420,20 @@
             </a:pPr>
             <a:r>
               <a:rPr lang="en"/>
-              <a:t>Lisa Kames Ph.D. Student</a:t>
+              <a:t>BIO:</a:t>
             </a:r>
             <a:endParaRPr/>
           </a:p>
           <a:p>
-            <a:pPr indent="-311150" lvl="0" marL="457200" rtl="0" algn="l">
-              <a:spcBef>
-                <a:spcPts val="0"/>
-              </a:spcBef>
-              <a:spcAft>
-                <a:spcPts val="0"/>
-              </a:spcAft>
-              <a:buSzPts val="1300"/>
-              <a:buChar char="●"/>
+            <a:pPr indent="-298450" lvl="1" marL="914400" rtl="0" algn="l">
+              <a:spcBef>
+                <a:spcPts val="0"/>
+              </a:spcBef>
+              <a:spcAft>
+                <a:spcPts val="0"/>
+              </a:spcAft>
+              <a:buSzPts val="1100"/>
+              <a:buChar char="○"/>
             </a:pPr>
             <a:r>
               <a:rPr lang="en"/>
@@ -10450,6 +10442,23 @@
             <a:endParaRPr/>
           </a:p>
           <a:p>
+            <a:pPr indent="-298450" lvl="1" marL="914400" rtl="0" algn="l">
+              <a:spcBef>
+                <a:spcPts val="0"/>
+              </a:spcBef>
+              <a:spcAft>
+                <a:spcPts val="0"/>
+              </a:spcAft>
+              <a:buSzPts val="1100"/>
+              <a:buChar char="○"/>
+            </a:pPr>
+            <a:r>
+              <a:rPr lang="en"/>
+              <a:t>David Masaitis</a:t>
+            </a:r>
+            <a:endParaRPr/>
+          </a:p>
+          <a:p>
             <a:pPr indent="-311150" lvl="0" marL="457200" rtl="0" algn="l">
               <a:spcBef>
                 <a:spcPts val="0"/>
@@ -10462,20 +10471,178 @@
             </a:pPr>
             <a:r>
               <a:rPr lang="en"/>
-              <a:t>Dr. Ken Gibbs</a:t>
+              <a:t>MEE:</a:t>
             </a:r>
             <a:endParaRPr/>
           </a:p>
           <a:p>
-            <a:pPr indent="0" lvl="0" marL="0" rtl="0" algn="l">
-              <a:spcBef>
-                <a:spcPts val="1600"/>
-              </a:spcBef>
-              <a:spcAft>
-                <a:spcPts val="0"/>
-              </a:spcAft>
-              <a:buNone/>
+            <a:pPr indent="-298450" lvl="1" marL="914400" rtl="0" algn="l">
+              <a:spcBef>
+                <a:spcPts val="0"/>
+              </a:spcBef>
+              <a:spcAft>
+                <a:spcPts val="0"/>
+              </a:spcAft>
+              <a:buSzPts val="1100"/>
+              <a:buChar char="○"/>
             </a:pPr>
+            <a:r>
+              <a:rPr lang="en"/>
+              <a:t>Elisabeth Kames Ph.D. - Coordinator</a:t>
+            </a:r>
+            <a:endParaRPr/>
+          </a:p>
+          <a:p>
+            <a:pPr indent="-298450" lvl="1" marL="914400" rtl="0" algn="l">
+              <a:spcBef>
+                <a:spcPts val="0"/>
+              </a:spcBef>
+              <a:spcAft>
+                <a:spcPts val="0"/>
+              </a:spcAft>
+              <a:buSzPts val="1100"/>
+              <a:buChar char="○"/>
+            </a:pPr>
+            <a:r>
+              <a:rPr lang="en"/>
+              <a:t>Dominic Allard</a:t>
+            </a:r>
+            <a:endParaRPr/>
+          </a:p>
+          <a:p>
+            <a:pPr indent="-298450" lvl="1" marL="914400" rtl="0" algn="l">
+              <a:spcBef>
+                <a:spcPts val="0"/>
+              </a:spcBef>
+              <a:spcAft>
+                <a:spcPts val="0"/>
+              </a:spcAft>
+              <a:buSzPts val="1100"/>
+              <a:buChar char="○"/>
+            </a:pPr>
+            <a:r>
+              <a:rPr lang="en"/>
+              <a:t>Courtney Cline</a:t>
+            </a:r>
+            <a:endParaRPr/>
+          </a:p>
+          <a:p>
+            <a:pPr indent="-298450" lvl="1" marL="914400" rtl="0" algn="l">
+              <a:spcBef>
+                <a:spcPts val="0"/>
+              </a:spcBef>
+              <a:spcAft>
+                <a:spcPts val="0"/>
+              </a:spcAft>
+              <a:buSzPts val="1100"/>
+              <a:buChar char="○"/>
+            </a:pPr>
+            <a:r>
+              <a:rPr lang="en"/>
+              <a:t>Joseph Luya</a:t>
+            </a:r>
+            <a:endParaRPr/>
+          </a:p>
+          <a:p>
+            <a:pPr indent="-298450" lvl="1" marL="914400" rtl="0" algn="l">
+              <a:spcBef>
+                <a:spcPts val="0"/>
+              </a:spcBef>
+              <a:spcAft>
+                <a:spcPts val="0"/>
+              </a:spcAft>
+              <a:buSzPts val="1100"/>
+              <a:buChar char="○"/>
+            </a:pPr>
+            <a:r>
+              <a:rPr lang="en"/>
+              <a:t>Bryce Johnson</a:t>
+            </a:r>
+            <a:endParaRPr/>
+          </a:p>
+          <a:p>
+            <a:pPr indent="-298450" lvl="1" marL="914400" rtl="0" algn="l">
+              <a:spcBef>
+                <a:spcPts val="0"/>
+              </a:spcBef>
+              <a:spcAft>
+                <a:spcPts val="0"/>
+              </a:spcAft>
+              <a:buSzPts val="1100"/>
+              <a:buChar char="○"/>
+            </a:pPr>
+            <a:r>
+              <a:rPr lang="en"/>
+              <a:t>Philip Bernhard</a:t>
+            </a:r>
+            <a:endParaRPr/>
+          </a:p>
+          <a:p>
+            <a:pPr indent="-298450" lvl="1" marL="914400" rtl="0" algn="l">
+              <a:spcBef>
+                <a:spcPts val="0"/>
+              </a:spcBef>
+              <a:spcAft>
+                <a:spcPts val="0"/>
+              </a:spcAft>
+              <a:buSzPts val="1100"/>
+              <a:buChar char="○"/>
+            </a:pPr>
+            <a:r>
+              <a:rPr lang="en"/>
+              <a:t>Timothy Frazier</a:t>
+            </a:r>
+            <a:endParaRPr/>
+          </a:p>
+          <a:p>
+            <a:pPr indent="-298450" lvl="1" marL="914400" rtl="0" algn="l">
+              <a:spcBef>
+                <a:spcPts val="0"/>
+              </a:spcBef>
+              <a:spcAft>
+                <a:spcPts val="0"/>
+              </a:spcAft>
+              <a:buSzPts val="1100"/>
+              <a:buChar char="○"/>
+            </a:pPr>
+            <a:r>
+              <a:rPr lang="en"/>
+              <a:t>Joshua Calhoun</a:t>
+            </a:r>
+            <a:endParaRPr/>
+          </a:p>
+          <a:p>
+            <a:pPr indent="-298450" lvl="1" marL="914400" rtl="0" algn="l">
+              <a:spcBef>
+                <a:spcPts val="0"/>
+              </a:spcBef>
+              <a:spcAft>
+                <a:spcPts val="0"/>
+              </a:spcAft>
+              <a:buSzPts val="1100"/>
+              <a:buChar char="○"/>
+            </a:pPr>
+            <a:r>
+              <a:rPr lang="en"/>
+              <a:t>Kali Jenson- AEE student</a:t>
+            </a:r>
+            <a:endParaRPr/>
+          </a:p>
+          <a:p>
+            <a:pPr indent="-298450" lvl="1" marL="914400" rtl="0" algn="l">
+              <a:spcBef>
+                <a:spcPts val="0"/>
+              </a:spcBef>
+              <a:spcAft>
+                <a:spcPts val="0"/>
+              </a:spcAft>
+              <a:buSzPts val="1100"/>
+              <a:buChar char="○"/>
+            </a:pPr>
+            <a:r>
+              <a:rPr lang="en"/>
+              <a:t>Chris Mateo- ECE student</a:t>
+            </a:r>
             <a:r>
               <a:rPr lang="en"/>
               <a:t> </a:t>
@@ -10708,8 +10875,14 @@
             <a:avLst/>
           </a:prstGeom>
           <a:noFill/>
-          <a:ln>
-            <a:noFill/>
+          <a:ln cap="flat" cmpd="sng" w="19050">
+            <a:solidFill>
+              <a:schemeClr val="dk2"/>
+            </a:solidFill>
+            <a:prstDash val="solid"/>
+            <a:round/>
+            <a:headEnd len="sm" w="sm" type="none"/>
+            <a:tailEnd len="sm" w="sm" type="none"/>
           </a:ln>
         </p:spPr>
       </p:pic>
@@ -11135,9 +11308,13 @@
             </a:pPr>
             <a:r>
               <a:rPr lang="en"/>
-              <a:t>Use sensors to detect environment composition and trigger appropriate system responses</a:t>
+              <a:t>Use sensors to detect environment composition and trigger appropriate system responses. E.g. water, light, nitrogen, CO</a:t>
             </a:r>
-            <a:endParaRPr/>
+            <a:r>
+              <a:rPr baseline="-25000" lang="en"/>
+              <a:t>2</a:t>
+            </a:r>
+            <a:endParaRPr baseline="-25000"/>
           </a:p>
           <a:p>
             <a:pPr indent="-298450" lvl="1" marL="914400" rtl="0" algn="l">
@@ -11255,23 +11432,6 @@
             <a:r>
               <a:rPr lang="en"/>
               <a:t>Reorder all actuators and queues for the next cycle</a:t>
-            </a:r>
-            <a:endParaRPr/>
-          </a:p>
-          <a:p>
-            <a:pPr indent="-311150" lvl="0" marL="457200" rtl="0" algn="l">
-              <a:spcBef>
-                <a:spcPts val="0"/>
-              </a:spcBef>
-              <a:spcAft>
-                <a:spcPts val="0"/>
-              </a:spcAft>
-              <a:buSzPts val="1300"/>
-              <a:buChar char="●"/>
-            </a:pPr>
-            <a:r>
-              <a:rPr lang="en"/>
-              <a:t>Restart</a:t>
             </a:r>
             <a:endParaRPr/>
           </a:p>
@@ -11293,19 +11453,19 @@
         </p:blipFill>
         <p:spPr>
           <a:xfrm>
-            <a:off x="5959050" y="2000700"/>
-            <a:ext cx="2861450" cy="2749100"/>
+            <a:off x="5870550" y="1730925"/>
+            <a:ext cx="3035974" cy="3008225"/>
           </a:xfrm>
           <a:prstGeom prst="rect">
             <a:avLst/>
           </a:prstGeom>
           <a:noFill/>
-          <a:ln cap="flat" cmpd="sng" w="25400">
+          <a:ln cap="flat" cmpd="sng" w="19050">
             <a:solidFill>
-              <a:srgbClr val="666666"/>
+              <a:schemeClr val="dk2"/>
             </a:solidFill>
             <a:prstDash val="solid"/>
-            <a:miter lim="8000"/>
+            <a:round/>
             <a:headEnd len="sm" w="sm" type="none"/>
             <a:tailEnd len="sm" w="sm" type="none"/>
           </a:ln>
@@ -11720,8 +11880,14 @@
             <a:avLst/>
           </a:prstGeom>
           <a:noFill/>
-          <a:ln>
-            <a:noFill/>
+          <a:ln cap="flat" cmpd="sng" w="19050">
+            <a:solidFill>
+              <a:schemeClr val="dk2"/>
+            </a:solidFill>
+            <a:prstDash val="solid"/>
+            <a:round/>
+            <a:headEnd len="sm" w="sm" type="none"/>
+            <a:tailEnd len="sm" w="sm" type="none"/>
           </a:ln>
         </p:spPr>
       </p:pic>
@@ -11812,6 +11978,26 @@
             <a:noAutofit/>
           </a:bodyPr>
           <a:lstStyle/>
+          <a:p>
+            <a:pPr indent="-317500" lvl="0" marL="457200" rtl="0" algn="l">
+              <a:lnSpc>
+                <a:spcPct val="150000"/>
+              </a:lnSpc>
+              <a:spcBef>
+                <a:spcPts val="0"/>
+              </a:spcBef>
+              <a:spcAft>
+                <a:spcPts val="0"/>
+              </a:spcAft>
+              <a:buSzPts val="1400"/>
+              <a:buChar char="●"/>
+            </a:pPr>
+            <a:r>
+              <a:rPr lang="en" sz="1400"/>
+              <a:t>Choosing microcontroller</a:t>
+            </a:r>
+            <a:endParaRPr sz="1400"/>
+          </a:p>
           <a:p>
             <a:pPr indent="-317500" lvl="0" marL="457200" rtl="0" algn="l">
               <a:lnSpc>
@@ -12156,7 +12342,7 @@
             </a:pPr>
             <a:r>
               <a:rPr lang="en" sz="1400"/>
-              <a:t>Implement inheritable high-level interfaces for sensor communication</a:t>
+              <a:t>Implement inheritable high-level interfaces/classes for sensor communication</a:t>
             </a:r>
             <a:endParaRPr sz="1400"/>
           </a:p>
@@ -12316,6 +12502,42 @@
             <a:r>
               <a:rPr lang="en" sz="1400"/>
               <a:t>Start a preliminary product breakdown structure</a:t>
+            </a:r>
+            <a:endParaRPr sz="1400"/>
+          </a:p>
+          <a:p>
+            <a:pPr indent="-317500" lvl="0" marL="457200" rtl="0" algn="l">
+              <a:lnSpc>
+                <a:spcPct val="115000"/>
+              </a:lnSpc>
+              <a:spcBef>
+                <a:spcPts val="0"/>
+              </a:spcBef>
+              <a:spcAft>
+                <a:spcPts val="0"/>
+              </a:spcAft>
+              <a:buSzPts val="1400"/>
+              <a:buChar char="●"/>
+            </a:pPr>
+            <a:r>
+              <a:rPr lang="en" sz="1400"/>
+              <a:t>At least one sensor and actuator </a:t>
+            </a:r>
+            <a:r>
+              <a:rPr lang="en" sz="1400"/>
+              <a:t>functioning</a:t>
+            </a:r>
+            <a:r>
+              <a:rPr lang="en" sz="1400"/>
+              <a:t> </a:t>
+            </a:r>
+            <a:r>
+              <a:rPr lang="en" sz="1400"/>
+              <a:t>according</a:t>
+            </a:r>
+            <a:r>
+              <a:rPr lang="en" sz="1400"/>
+              <a:t> to some schedule and simulated environment</a:t>
             </a:r>
             <a:endParaRPr sz="1400"/>
           </a:p>

</xml_diff>